<commit_message>
Revert "Merge branch 'master' of https://github.com/UA-ast502-2020/classnotebook"
This reverts commit 2ed10f4757e90951e5bfad178cb65f3799307ba0, reversing
changes made to 228902ec4f19ff451fc9b14e92f1a25ac7391da2.
</commit_message>
<xml_diff>
--- a/Maximum Likelihood Estimation lecture.pptx
+++ b/Maximum Likelihood Estimation lecture.pptx
@@ -207,7 +207,7 @@
           <a:p>
             <a:fld id="{C6271412-17BF-4B0D-A84E-51C772B11AC2}" type="datetimeFigureOut">
               <a:rPr lang="en-US" smtClean="0"/>
-              <a:t>2/3/20</a:t>
+              <a:t>2/3/2020</a:t>
             </a:fld>
             <a:endParaRPr lang="en-US"/>
           </a:p>
@@ -629,7 +629,7 @@
           <a:p>
             <a:fld id="{31A36792-1F33-4756-958C-963391896004}" type="datetime1">
               <a:rPr lang="en-US" smtClean="0"/>
-              <a:t>2/3/20</a:t>
+              <a:t>2/3/2020</a:t>
             </a:fld>
             <a:endParaRPr lang="en-US"/>
           </a:p>
@@ -781,7 +781,7 @@
           <a:p>
             <a:fld id="{4C039F47-CFBE-4DE6-8790-3D2B807D8765}" type="datetime1">
               <a:rPr lang="en-US" smtClean="0"/>
-              <a:t>2/3/20</a:t>
+              <a:t>2/3/2020</a:t>
             </a:fld>
             <a:endParaRPr lang="en-US"/>
           </a:p>
@@ -969,7 +969,7 @@
           <a:p>
             <a:fld id="{72737084-2568-43A4-8482-AD67204FAB11}" type="datetime1">
               <a:rPr lang="en-US" smtClean="0"/>
-              <a:t>2/3/20</a:t>
+              <a:t>2/3/2020</a:t>
             </a:fld>
             <a:endParaRPr lang="en-US"/>
           </a:p>
@@ -1191,7 +1191,7 @@
           <a:p>
             <a:fld id="{6A03A38D-0E64-4DF7-99B2-275999794B14}" type="datetime1">
               <a:rPr lang="en-US" smtClean="0"/>
-              <a:t>2/3/20</a:t>
+              <a:t>2/3/2020</a:t>
             </a:fld>
             <a:endParaRPr lang="en-US"/>
           </a:p>
@@ -1469,7 +1469,7 @@
           <a:p>
             <a:fld id="{A8A0EEA1-D7F5-4EAD-9051-6D58CFDB7B5F}" type="datetime1">
               <a:rPr lang="en-US" smtClean="0"/>
-              <a:t>2/3/20</a:t>
+              <a:t>2/3/2020</a:t>
             </a:fld>
             <a:endParaRPr lang="en-US"/>
           </a:p>
@@ -1734,7 +1734,7 @@
           <a:p>
             <a:fld id="{519E315A-6E08-4094-B5CF-7D2EC2DA969D}" type="datetime1">
               <a:rPr lang="en-US" smtClean="0"/>
-              <a:t>2/3/20</a:t>
+              <a:t>2/3/2020</a:t>
             </a:fld>
             <a:endParaRPr lang="en-US"/>
           </a:p>
@@ -2142,7 +2142,7 @@
           <a:p>
             <a:fld id="{D3AF7C97-70C8-485A-BF2F-231714374E76}" type="datetime1">
               <a:rPr lang="en-US" smtClean="0"/>
-              <a:t>2/3/20</a:t>
+              <a:t>2/3/2020</a:t>
             </a:fld>
             <a:endParaRPr lang="en-US"/>
           </a:p>
@@ -2237,7 +2237,7 @@
           <a:p>
             <a:fld id="{EDEE88B1-12EB-40B6-88D3-20FD09273DBD}" type="datetime1">
               <a:rPr lang="en-US" smtClean="0"/>
-              <a:t>2/3/20</a:t>
+              <a:t>2/3/2020</a:t>
             </a:fld>
             <a:endParaRPr lang="en-US"/>
           </a:p>
@@ -2309,7 +2309,7 @@
           <a:p>
             <a:fld id="{8B372F2E-6696-4F7D-9233-4376AF5BBED6}" type="datetime1">
               <a:rPr lang="en-US" smtClean="0"/>
-              <a:t>2/3/20</a:t>
+              <a:t>2/3/2020</a:t>
             </a:fld>
             <a:endParaRPr lang="en-US"/>
           </a:p>
@@ -2655,7 +2655,7 @@
           <a:p>
             <a:fld id="{A51A41C7-FA72-4CF2-B99F-665A282D913E}" type="datetime1">
               <a:rPr lang="en-US" smtClean="0"/>
-              <a:t>2/3/20</a:t>
+              <a:t>2/3/2020</a:t>
             </a:fld>
             <a:endParaRPr lang="en-US"/>
           </a:p>
@@ -2963,7 +2963,7 @@
           <a:p>
             <a:fld id="{4DBC4182-957E-42AB-B543-C9A45E85D264}" type="datetime1">
               <a:rPr lang="en-US" smtClean="0"/>
-              <a:t>2/3/20</a:t>
+              <a:t>2/3/2020</a:t>
             </a:fld>
             <a:endParaRPr lang="en-US"/>
           </a:p>
@@ -3184,7 +3184,7 @@
           <a:p>
             <a:fld id="{E7D01A91-D7F1-45CE-BFCB-B9C6492591A5}" type="datetime1">
               <a:rPr lang="en-US" smtClean="0"/>
-              <a:t>2/3/20</a:t>
+              <a:t>2/3/2020</a:t>
             </a:fld>
             <a:endParaRPr lang="en-US"/>
           </a:p>
@@ -3725,25 +3725,8 @@
           <a:p>
             <a:r>
               <a:rPr lang="en-US" dirty="0"/>
-              <a:t>Are we </a:t>
-            </a:r>
-            <a:r>
-              <a:rPr lang="en-US" dirty="0">
-                <a:solidFill>
-                  <a:srgbClr val="FF0000"/>
-                </a:solidFill>
-              </a:rPr>
-              <a:t>over-fitting</a:t>
-            </a:r>
-            <a:r>
-              <a:rPr lang="en-US" dirty="0"/>
-              <a:t> the data? </a:t>
-            </a:r>
-            <a:r>
-              <a:rPr lang="en-US" sz="1400" dirty="0"/>
-              <a:t>(Bayesian approach has another criteria)</a:t>
-            </a:r>
-            <a:endParaRPr lang="en-US" dirty="0"/>
+              <a:t>Are we over-fitting the data?</a:t>
+            </a:r>
           </a:p>
         </p:txBody>
       </p:sp>
@@ -4518,27 +4501,7 @@
           <a:p>
             <a:r>
               <a:rPr lang="en-US" dirty="0"/>
-              <a:t>If your likelihood is a mixture of </a:t>
-            </a:r>
-            <a:r>
-              <a:rPr lang="en-US" dirty="0">
-                <a:solidFill>
-                  <a:srgbClr val="FF0000"/>
-                </a:solidFill>
-              </a:rPr>
-              <a:t>multiple Gaussians</a:t>
-            </a:r>
-            <a:r>
-              <a:rPr lang="en-US" dirty="0"/>
-              <a:t>: (</a:t>
-            </a:r>
-            <a:r>
-              <a:rPr lang="en-US" sz="1200" dirty="0"/>
-              <a:t>approximate any distribution by multiple Gaussians</a:t>
-            </a:r>
-            <a:r>
-              <a:rPr lang="en-US" dirty="0"/>
-              <a:t>)</a:t>
+              <a:t>If your likelihood is a mixture of multiple Gaussians:</a:t>
             </a:r>
           </a:p>
           <a:p>
@@ -4560,16 +4523,8 @@
           <a:p>
             <a:pPr lvl="2"/>
             <a:r>
-              <a:rPr lang="en-US" dirty="0">
-                <a:solidFill>
-                  <a:srgbClr val="FF0000"/>
-                </a:solidFill>
-              </a:rPr>
-              <a:t>Bootstrap and jackknife methods</a:t>
-            </a:r>
-            <a:r>
               <a:rPr lang="en-US" dirty="0"/>
-              <a:t>: see code in section 4.5</a:t>
+              <a:t>Bootstrap and jackknife methods: see code in section 4.5</a:t>
             </a:r>
           </a:p>
         </p:txBody>
@@ -4632,8 +4587,8 @@
           </a:p>
         </p:txBody>
       </p:sp>
-      <mc:AlternateContent xmlns:mc="http://schemas.openxmlformats.org/markup-compatibility/2006" xmlns:a14="http://schemas.microsoft.com/office/drawing/2010/main">
-        <mc:Choice Requires="a14">
+      <mc:AlternateContent xmlns:mc="http://schemas.openxmlformats.org/markup-compatibility/2006">
+        <mc:Choice xmlns:a14="http://schemas.microsoft.com/office/drawing/2010/main" Requires="a14">
           <p:sp>
             <p:nvSpPr>
               <p:cNvPr id="3" name="Content Placeholder 2">
@@ -4832,7 +4787,7 @@
             </p:txBody>
           </p:sp>
         </mc:Choice>
-        <mc:Fallback xmlns="">
+        <mc:Fallback>
           <p:sp>
             <p:nvSpPr>
               <p:cNvPr id="3" name="Content Placeholder 2">

</xml_diff>

<commit_message>
Revert "Revert "Merge branch 'master' of https://github.com/UA-ast502-2020/classnotebook""
This reverts commit 2b7843cfe0967fc2c88e53aadef84d6c7fa20abc.
</commit_message>
<xml_diff>
--- a/Maximum Likelihood Estimation lecture.pptx
+++ b/Maximum Likelihood Estimation lecture.pptx
@@ -207,7 +207,7 @@
           <a:p>
             <a:fld id="{C6271412-17BF-4B0D-A84E-51C772B11AC2}" type="datetimeFigureOut">
               <a:rPr lang="en-US" smtClean="0"/>
-              <a:t>2/3/2020</a:t>
+              <a:t>2/3/20</a:t>
             </a:fld>
             <a:endParaRPr lang="en-US"/>
           </a:p>
@@ -629,7 +629,7 @@
           <a:p>
             <a:fld id="{31A36792-1F33-4756-958C-963391896004}" type="datetime1">
               <a:rPr lang="en-US" smtClean="0"/>
-              <a:t>2/3/2020</a:t>
+              <a:t>2/3/20</a:t>
             </a:fld>
             <a:endParaRPr lang="en-US"/>
           </a:p>
@@ -781,7 +781,7 @@
           <a:p>
             <a:fld id="{4C039F47-CFBE-4DE6-8790-3D2B807D8765}" type="datetime1">
               <a:rPr lang="en-US" smtClean="0"/>
-              <a:t>2/3/2020</a:t>
+              <a:t>2/3/20</a:t>
             </a:fld>
             <a:endParaRPr lang="en-US"/>
           </a:p>
@@ -969,7 +969,7 @@
           <a:p>
             <a:fld id="{72737084-2568-43A4-8482-AD67204FAB11}" type="datetime1">
               <a:rPr lang="en-US" smtClean="0"/>
-              <a:t>2/3/2020</a:t>
+              <a:t>2/3/20</a:t>
             </a:fld>
             <a:endParaRPr lang="en-US"/>
           </a:p>
@@ -1191,7 +1191,7 @@
           <a:p>
             <a:fld id="{6A03A38D-0E64-4DF7-99B2-275999794B14}" type="datetime1">
               <a:rPr lang="en-US" smtClean="0"/>
-              <a:t>2/3/2020</a:t>
+              <a:t>2/3/20</a:t>
             </a:fld>
             <a:endParaRPr lang="en-US"/>
           </a:p>
@@ -1469,7 +1469,7 @@
           <a:p>
             <a:fld id="{A8A0EEA1-D7F5-4EAD-9051-6D58CFDB7B5F}" type="datetime1">
               <a:rPr lang="en-US" smtClean="0"/>
-              <a:t>2/3/2020</a:t>
+              <a:t>2/3/20</a:t>
             </a:fld>
             <a:endParaRPr lang="en-US"/>
           </a:p>
@@ -1734,7 +1734,7 @@
           <a:p>
             <a:fld id="{519E315A-6E08-4094-B5CF-7D2EC2DA969D}" type="datetime1">
               <a:rPr lang="en-US" smtClean="0"/>
-              <a:t>2/3/2020</a:t>
+              <a:t>2/3/20</a:t>
             </a:fld>
             <a:endParaRPr lang="en-US"/>
           </a:p>
@@ -2142,7 +2142,7 @@
           <a:p>
             <a:fld id="{D3AF7C97-70C8-485A-BF2F-231714374E76}" type="datetime1">
               <a:rPr lang="en-US" smtClean="0"/>
-              <a:t>2/3/2020</a:t>
+              <a:t>2/3/20</a:t>
             </a:fld>
             <a:endParaRPr lang="en-US"/>
           </a:p>
@@ -2237,7 +2237,7 @@
           <a:p>
             <a:fld id="{EDEE88B1-12EB-40B6-88D3-20FD09273DBD}" type="datetime1">
               <a:rPr lang="en-US" smtClean="0"/>
-              <a:t>2/3/2020</a:t>
+              <a:t>2/3/20</a:t>
             </a:fld>
             <a:endParaRPr lang="en-US"/>
           </a:p>
@@ -2309,7 +2309,7 @@
           <a:p>
             <a:fld id="{8B372F2E-6696-4F7D-9233-4376AF5BBED6}" type="datetime1">
               <a:rPr lang="en-US" smtClean="0"/>
-              <a:t>2/3/2020</a:t>
+              <a:t>2/3/20</a:t>
             </a:fld>
             <a:endParaRPr lang="en-US"/>
           </a:p>
@@ -2655,7 +2655,7 @@
           <a:p>
             <a:fld id="{A51A41C7-FA72-4CF2-B99F-665A282D913E}" type="datetime1">
               <a:rPr lang="en-US" smtClean="0"/>
-              <a:t>2/3/2020</a:t>
+              <a:t>2/3/20</a:t>
             </a:fld>
             <a:endParaRPr lang="en-US"/>
           </a:p>
@@ -2963,7 +2963,7 @@
           <a:p>
             <a:fld id="{4DBC4182-957E-42AB-B543-C9A45E85D264}" type="datetime1">
               <a:rPr lang="en-US" smtClean="0"/>
-              <a:t>2/3/2020</a:t>
+              <a:t>2/3/20</a:t>
             </a:fld>
             <a:endParaRPr lang="en-US"/>
           </a:p>
@@ -3184,7 +3184,7 @@
           <a:p>
             <a:fld id="{E7D01A91-D7F1-45CE-BFCB-B9C6492591A5}" type="datetime1">
               <a:rPr lang="en-US" smtClean="0"/>
-              <a:t>2/3/2020</a:t>
+              <a:t>2/3/20</a:t>
             </a:fld>
             <a:endParaRPr lang="en-US"/>
           </a:p>
@@ -3725,8 +3725,25 @@
           <a:p>
             <a:r>
               <a:rPr lang="en-US" dirty="0"/>
-              <a:t>Are we over-fitting the data?</a:t>
-            </a:r>
+              <a:t>Are we </a:t>
+            </a:r>
+            <a:r>
+              <a:rPr lang="en-US" dirty="0">
+                <a:solidFill>
+                  <a:srgbClr val="FF0000"/>
+                </a:solidFill>
+              </a:rPr>
+              <a:t>over-fitting</a:t>
+            </a:r>
+            <a:r>
+              <a:rPr lang="en-US" dirty="0"/>
+              <a:t> the data? </a:t>
+            </a:r>
+            <a:r>
+              <a:rPr lang="en-US" sz="1400" dirty="0"/>
+              <a:t>(Bayesian approach has another criteria)</a:t>
+            </a:r>
+            <a:endParaRPr lang="en-US" dirty="0"/>
           </a:p>
         </p:txBody>
       </p:sp>
@@ -4501,7 +4518,27 @@
           <a:p>
             <a:r>
               <a:rPr lang="en-US" dirty="0"/>
-              <a:t>If your likelihood is a mixture of multiple Gaussians:</a:t>
+              <a:t>If your likelihood is a mixture of </a:t>
+            </a:r>
+            <a:r>
+              <a:rPr lang="en-US" dirty="0">
+                <a:solidFill>
+                  <a:srgbClr val="FF0000"/>
+                </a:solidFill>
+              </a:rPr>
+              <a:t>multiple Gaussians</a:t>
+            </a:r>
+            <a:r>
+              <a:rPr lang="en-US" dirty="0"/>
+              <a:t>: (</a:t>
+            </a:r>
+            <a:r>
+              <a:rPr lang="en-US" sz="1200" dirty="0"/>
+              <a:t>approximate any distribution by multiple Gaussians</a:t>
+            </a:r>
+            <a:r>
+              <a:rPr lang="en-US" dirty="0"/>
+              <a:t>)</a:t>
             </a:r>
           </a:p>
           <a:p>
@@ -4523,8 +4560,16 @@
           <a:p>
             <a:pPr lvl="2"/>
             <a:r>
+              <a:rPr lang="en-US" dirty="0">
+                <a:solidFill>
+                  <a:srgbClr val="FF0000"/>
+                </a:solidFill>
+              </a:rPr>
+              <a:t>Bootstrap and jackknife methods</a:t>
+            </a:r>
+            <a:r>
               <a:rPr lang="en-US" dirty="0"/>
-              <a:t>Bootstrap and jackknife methods: see code in section 4.5</a:t>
+              <a:t>: see code in section 4.5</a:t>
             </a:r>
           </a:p>
         </p:txBody>
@@ -4587,8 +4632,8 @@
           </a:p>
         </p:txBody>
       </p:sp>
-      <mc:AlternateContent xmlns:mc="http://schemas.openxmlformats.org/markup-compatibility/2006">
-        <mc:Choice xmlns:a14="http://schemas.microsoft.com/office/drawing/2010/main" Requires="a14">
+      <mc:AlternateContent xmlns:mc="http://schemas.openxmlformats.org/markup-compatibility/2006" xmlns:a14="http://schemas.microsoft.com/office/drawing/2010/main">
+        <mc:Choice Requires="a14">
           <p:sp>
             <p:nvSpPr>
               <p:cNvPr id="3" name="Content Placeholder 2">
@@ -4787,7 +4832,7 @@
             </p:txBody>
           </p:sp>
         </mc:Choice>
-        <mc:Fallback>
+        <mc:Fallback xmlns="">
           <p:sp>
             <p:nvSpPr>
               <p:cNvPr id="3" name="Content Placeholder 2">

</xml_diff>

<commit_message>
Revert "Revert "Revert "Merge branch 'master' of https://github.com/UA-ast502-2020/classnotebook"""
This reverts commit d89640dc0835bd73eb5eee0a78e674a4b6a2c842.
</commit_message>
<xml_diff>
--- a/Maximum Likelihood Estimation lecture.pptx
+++ b/Maximum Likelihood Estimation lecture.pptx
@@ -207,7 +207,7 @@
           <a:p>
             <a:fld id="{C6271412-17BF-4B0D-A84E-51C772B11AC2}" type="datetimeFigureOut">
               <a:rPr lang="en-US" smtClean="0"/>
-              <a:t>2/3/20</a:t>
+              <a:t>2/3/2020</a:t>
             </a:fld>
             <a:endParaRPr lang="en-US"/>
           </a:p>
@@ -629,7 +629,7 @@
           <a:p>
             <a:fld id="{31A36792-1F33-4756-958C-963391896004}" type="datetime1">
               <a:rPr lang="en-US" smtClean="0"/>
-              <a:t>2/3/20</a:t>
+              <a:t>2/3/2020</a:t>
             </a:fld>
             <a:endParaRPr lang="en-US"/>
           </a:p>
@@ -781,7 +781,7 @@
           <a:p>
             <a:fld id="{4C039F47-CFBE-4DE6-8790-3D2B807D8765}" type="datetime1">
               <a:rPr lang="en-US" smtClean="0"/>
-              <a:t>2/3/20</a:t>
+              <a:t>2/3/2020</a:t>
             </a:fld>
             <a:endParaRPr lang="en-US"/>
           </a:p>
@@ -969,7 +969,7 @@
           <a:p>
             <a:fld id="{72737084-2568-43A4-8482-AD67204FAB11}" type="datetime1">
               <a:rPr lang="en-US" smtClean="0"/>
-              <a:t>2/3/20</a:t>
+              <a:t>2/3/2020</a:t>
             </a:fld>
             <a:endParaRPr lang="en-US"/>
           </a:p>
@@ -1191,7 +1191,7 @@
           <a:p>
             <a:fld id="{6A03A38D-0E64-4DF7-99B2-275999794B14}" type="datetime1">
               <a:rPr lang="en-US" smtClean="0"/>
-              <a:t>2/3/20</a:t>
+              <a:t>2/3/2020</a:t>
             </a:fld>
             <a:endParaRPr lang="en-US"/>
           </a:p>
@@ -1469,7 +1469,7 @@
           <a:p>
             <a:fld id="{A8A0EEA1-D7F5-4EAD-9051-6D58CFDB7B5F}" type="datetime1">
               <a:rPr lang="en-US" smtClean="0"/>
-              <a:t>2/3/20</a:t>
+              <a:t>2/3/2020</a:t>
             </a:fld>
             <a:endParaRPr lang="en-US"/>
           </a:p>
@@ -1734,7 +1734,7 @@
           <a:p>
             <a:fld id="{519E315A-6E08-4094-B5CF-7D2EC2DA969D}" type="datetime1">
               <a:rPr lang="en-US" smtClean="0"/>
-              <a:t>2/3/20</a:t>
+              <a:t>2/3/2020</a:t>
             </a:fld>
             <a:endParaRPr lang="en-US"/>
           </a:p>
@@ -2142,7 +2142,7 @@
           <a:p>
             <a:fld id="{D3AF7C97-70C8-485A-BF2F-231714374E76}" type="datetime1">
               <a:rPr lang="en-US" smtClean="0"/>
-              <a:t>2/3/20</a:t>
+              <a:t>2/3/2020</a:t>
             </a:fld>
             <a:endParaRPr lang="en-US"/>
           </a:p>
@@ -2237,7 +2237,7 @@
           <a:p>
             <a:fld id="{EDEE88B1-12EB-40B6-88D3-20FD09273DBD}" type="datetime1">
               <a:rPr lang="en-US" smtClean="0"/>
-              <a:t>2/3/20</a:t>
+              <a:t>2/3/2020</a:t>
             </a:fld>
             <a:endParaRPr lang="en-US"/>
           </a:p>
@@ -2309,7 +2309,7 @@
           <a:p>
             <a:fld id="{8B372F2E-6696-4F7D-9233-4376AF5BBED6}" type="datetime1">
               <a:rPr lang="en-US" smtClean="0"/>
-              <a:t>2/3/20</a:t>
+              <a:t>2/3/2020</a:t>
             </a:fld>
             <a:endParaRPr lang="en-US"/>
           </a:p>
@@ -2655,7 +2655,7 @@
           <a:p>
             <a:fld id="{A51A41C7-FA72-4CF2-B99F-665A282D913E}" type="datetime1">
               <a:rPr lang="en-US" smtClean="0"/>
-              <a:t>2/3/20</a:t>
+              <a:t>2/3/2020</a:t>
             </a:fld>
             <a:endParaRPr lang="en-US"/>
           </a:p>
@@ -2963,7 +2963,7 @@
           <a:p>
             <a:fld id="{4DBC4182-957E-42AB-B543-C9A45E85D264}" type="datetime1">
               <a:rPr lang="en-US" smtClean="0"/>
-              <a:t>2/3/20</a:t>
+              <a:t>2/3/2020</a:t>
             </a:fld>
             <a:endParaRPr lang="en-US"/>
           </a:p>
@@ -3184,7 +3184,7 @@
           <a:p>
             <a:fld id="{E7D01A91-D7F1-45CE-BFCB-B9C6492591A5}" type="datetime1">
               <a:rPr lang="en-US" smtClean="0"/>
-              <a:t>2/3/20</a:t>
+              <a:t>2/3/2020</a:t>
             </a:fld>
             <a:endParaRPr lang="en-US"/>
           </a:p>
@@ -3725,25 +3725,8 @@
           <a:p>
             <a:r>
               <a:rPr lang="en-US" dirty="0"/>
-              <a:t>Are we </a:t>
-            </a:r>
-            <a:r>
-              <a:rPr lang="en-US" dirty="0">
-                <a:solidFill>
-                  <a:srgbClr val="FF0000"/>
-                </a:solidFill>
-              </a:rPr>
-              <a:t>over-fitting</a:t>
-            </a:r>
-            <a:r>
-              <a:rPr lang="en-US" dirty="0"/>
-              <a:t> the data? </a:t>
-            </a:r>
-            <a:r>
-              <a:rPr lang="en-US" sz="1400" dirty="0"/>
-              <a:t>(Bayesian approach has another criteria)</a:t>
-            </a:r>
-            <a:endParaRPr lang="en-US" dirty="0"/>
+              <a:t>Are we over-fitting the data?</a:t>
+            </a:r>
           </a:p>
         </p:txBody>
       </p:sp>
@@ -4518,27 +4501,7 @@
           <a:p>
             <a:r>
               <a:rPr lang="en-US" dirty="0"/>
-              <a:t>If your likelihood is a mixture of </a:t>
-            </a:r>
-            <a:r>
-              <a:rPr lang="en-US" dirty="0">
-                <a:solidFill>
-                  <a:srgbClr val="FF0000"/>
-                </a:solidFill>
-              </a:rPr>
-              <a:t>multiple Gaussians</a:t>
-            </a:r>
-            <a:r>
-              <a:rPr lang="en-US" dirty="0"/>
-              <a:t>: (</a:t>
-            </a:r>
-            <a:r>
-              <a:rPr lang="en-US" sz="1200" dirty="0"/>
-              <a:t>approximate any distribution by multiple Gaussians</a:t>
-            </a:r>
-            <a:r>
-              <a:rPr lang="en-US" dirty="0"/>
-              <a:t>)</a:t>
+              <a:t>If your likelihood is a mixture of multiple Gaussians:</a:t>
             </a:r>
           </a:p>
           <a:p>
@@ -4560,16 +4523,8 @@
           <a:p>
             <a:pPr lvl="2"/>
             <a:r>
-              <a:rPr lang="en-US" dirty="0">
-                <a:solidFill>
-                  <a:srgbClr val="FF0000"/>
-                </a:solidFill>
-              </a:rPr>
-              <a:t>Bootstrap and jackknife methods</a:t>
-            </a:r>
-            <a:r>
               <a:rPr lang="en-US" dirty="0"/>
-              <a:t>: see code in section 4.5</a:t>
+              <a:t>Bootstrap and jackknife methods: see code in section 4.5</a:t>
             </a:r>
           </a:p>
         </p:txBody>
@@ -4632,8 +4587,8 @@
           </a:p>
         </p:txBody>
       </p:sp>
-      <mc:AlternateContent xmlns:mc="http://schemas.openxmlformats.org/markup-compatibility/2006" xmlns:a14="http://schemas.microsoft.com/office/drawing/2010/main">
-        <mc:Choice Requires="a14">
+      <mc:AlternateContent xmlns:mc="http://schemas.openxmlformats.org/markup-compatibility/2006">
+        <mc:Choice xmlns:a14="http://schemas.microsoft.com/office/drawing/2010/main" Requires="a14">
           <p:sp>
             <p:nvSpPr>
               <p:cNvPr id="3" name="Content Placeholder 2">
@@ -4832,7 +4787,7 @@
             </p:txBody>
           </p:sp>
         </mc:Choice>
-        <mc:Fallback xmlns="">
+        <mc:Fallback>
           <p:sp>
             <p:nvSpPr>
               <p:cNvPr id="3" name="Content Placeholder 2">

</xml_diff>

<commit_message>
Revert "Revert "Revert "Revert "Merge branch 'master' of https://github.com/UA-ast502-2020/classnotebook""""
This reverts commit e846794aae335d07a8ecef0a0959fbac637bd9b7.
</commit_message>
<xml_diff>
--- a/Maximum Likelihood Estimation lecture.pptx
+++ b/Maximum Likelihood Estimation lecture.pptx
@@ -207,7 +207,7 @@
           <a:p>
             <a:fld id="{C6271412-17BF-4B0D-A84E-51C772B11AC2}" type="datetimeFigureOut">
               <a:rPr lang="en-US" smtClean="0"/>
-              <a:t>2/3/2020</a:t>
+              <a:t>2/3/20</a:t>
             </a:fld>
             <a:endParaRPr lang="en-US"/>
           </a:p>
@@ -629,7 +629,7 @@
           <a:p>
             <a:fld id="{31A36792-1F33-4756-958C-963391896004}" type="datetime1">
               <a:rPr lang="en-US" smtClean="0"/>
-              <a:t>2/3/2020</a:t>
+              <a:t>2/3/20</a:t>
             </a:fld>
             <a:endParaRPr lang="en-US"/>
           </a:p>
@@ -781,7 +781,7 @@
           <a:p>
             <a:fld id="{4C039F47-CFBE-4DE6-8790-3D2B807D8765}" type="datetime1">
               <a:rPr lang="en-US" smtClean="0"/>
-              <a:t>2/3/2020</a:t>
+              <a:t>2/3/20</a:t>
             </a:fld>
             <a:endParaRPr lang="en-US"/>
           </a:p>
@@ -969,7 +969,7 @@
           <a:p>
             <a:fld id="{72737084-2568-43A4-8482-AD67204FAB11}" type="datetime1">
               <a:rPr lang="en-US" smtClean="0"/>
-              <a:t>2/3/2020</a:t>
+              <a:t>2/3/20</a:t>
             </a:fld>
             <a:endParaRPr lang="en-US"/>
           </a:p>
@@ -1191,7 +1191,7 @@
           <a:p>
             <a:fld id="{6A03A38D-0E64-4DF7-99B2-275999794B14}" type="datetime1">
               <a:rPr lang="en-US" smtClean="0"/>
-              <a:t>2/3/2020</a:t>
+              <a:t>2/3/20</a:t>
             </a:fld>
             <a:endParaRPr lang="en-US"/>
           </a:p>
@@ -1469,7 +1469,7 @@
           <a:p>
             <a:fld id="{A8A0EEA1-D7F5-4EAD-9051-6D58CFDB7B5F}" type="datetime1">
               <a:rPr lang="en-US" smtClean="0"/>
-              <a:t>2/3/2020</a:t>
+              <a:t>2/3/20</a:t>
             </a:fld>
             <a:endParaRPr lang="en-US"/>
           </a:p>
@@ -1734,7 +1734,7 @@
           <a:p>
             <a:fld id="{519E315A-6E08-4094-B5CF-7D2EC2DA969D}" type="datetime1">
               <a:rPr lang="en-US" smtClean="0"/>
-              <a:t>2/3/2020</a:t>
+              <a:t>2/3/20</a:t>
             </a:fld>
             <a:endParaRPr lang="en-US"/>
           </a:p>
@@ -2142,7 +2142,7 @@
           <a:p>
             <a:fld id="{D3AF7C97-70C8-485A-BF2F-231714374E76}" type="datetime1">
               <a:rPr lang="en-US" smtClean="0"/>
-              <a:t>2/3/2020</a:t>
+              <a:t>2/3/20</a:t>
             </a:fld>
             <a:endParaRPr lang="en-US"/>
           </a:p>
@@ -2237,7 +2237,7 @@
           <a:p>
             <a:fld id="{EDEE88B1-12EB-40B6-88D3-20FD09273DBD}" type="datetime1">
               <a:rPr lang="en-US" smtClean="0"/>
-              <a:t>2/3/2020</a:t>
+              <a:t>2/3/20</a:t>
             </a:fld>
             <a:endParaRPr lang="en-US"/>
           </a:p>
@@ -2309,7 +2309,7 @@
           <a:p>
             <a:fld id="{8B372F2E-6696-4F7D-9233-4376AF5BBED6}" type="datetime1">
               <a:rPr lang="en-US" smtClean="0"/>
-              <a:t>2/3/2020</a:t>
+              <a:t>2/3/20</a:t>
             </a:fld>
             <a:endParaRPr lang="en-US"/>
           </a:p>
@@ -2655,7 +2655,7 @@
           <a:p>
             <a:fld id="{A51A41C7-FA72-4CF2-B99F-665A282D913E}" type="datetime1">
               <a:rPr lang="en-US" smtClean="0"/>
-              <a:t>2/3/2020</a:t>
+              <a:t>2/3/20</a:t>
             </a:fld>
             <a:endParaRPr lang="en-US"/>
           </a:p>
@@ -2963,7 +2963,7 @@
           <a:p>
             <a:fld id="{4DBC4182-957E-42AB-B543-C9A45E85D264}" type="datetime1">
               <a:rPr lang="en-US" smtClean="0"/>
-              <a:t>2/3/2020</a:t>
+              <a:t>2/3/20</a:t>
             </a:fld>
             <a:endParaRPr lang="en-US"/>
           </a:p>
@@ -3184,7 +3184,7 @@
           <a:p>
             <a:fld id="{E7D01A91-D7F1-45CE-BFCB-B9C6492591A5}" type="datetime1">
               <a:rPr lang="en-US" smtClean="0"/>
-              <a:t>2/3/2020</a:t>
+              <a:t>2/3/20</a:t>
             </a:fld>
             <a:endParaRPr lang="en-US"/>
           </a:p>
@@ -3725,8 +3725,25 @@
           <a:p>
             <a:r>
               <a:rPr lang="en-US" dirty="0"/>
-              <a:t>Are we over-fitting the data?</a:t>
-            </a:r>
+              <a:t>Are we </a:t>
+            </a:r>
+            <a:r>
+              <a:rPr lang="en-US" dirty="0">
+                <a:solidFill>
+                  <a:srgbClr val="FF0000"/>
+                </a:solidFill>
+              </a:rPr>
+              <a:t>over-fitting</a:t>
+            </a:r>
+            <a:r>
+              <a:rPr lang="en-US" dirty="0"/>
+              <a:t> the data? </a:t>
+            </a:r>
+            <a:r>
+              <a:rPr lang="en-US" sz="1400" dirty="0"/>
+              <a:t>(Bayesian approach has another criteria)</a:t>
+            </a:r>
+            <a:endParaRPr lang="en-US" dirty="0"/>
           </a:p>
         </p:txBody>
       </p:sp>
@@ -4501,7 +4518,27 @@
           <a:p>
             <a:r>
               <a:rPr lang="en-US" dirty="0"/>
-              <a:t>If your likelihood is a mixture of multiple Gaussians:</a:t>
+              <a:t>If your likelihood is a mixture of </a:t>
+            </a:r>
+            <a:r>
+              <a:rPr lang="en-US" dirty="0">
+                <a:solidFill>
+                  <a:srgbClr val="FF0000"/>
+                </a:solidFill>
+              </a:rPr>
+              <a:t>multiple Gaussians</a:t>
+            </a:r>
+            <a:r>
+              <a:rPr lang="en-US" dirty="0"/>
+              <a:t>: (</a:t>
+            </a:r>
+            <a:r>
+              <a:rPr lang="en-US" sz="1200" dirty="0"/>
+              <a:t>approximate any distribution by multiple Gaussians</a:t>
+            </a:r>
+            <a:r>
+              <a:rPr lang="en-US" dirty="0"/>
+              <a:t>)</a:t>
             </a:r>
           </a:p>
           <a:p>
@@ -4523,8 +4560,16 @@
           <a:p>
             <a:pPr lvl="2"/>
             <a:r>
+              <a:rPr lang="en-US" dirty="0">
+                <a:solidFill>
+                  <a:srgbClr val="FF0000"/>
+                </a:solidFill>
+              </a:rPr>
+              <a:t>Bootstrap and jackknife methods</a:t>
+            </a:r>
+            <a:r>
               <a:rPr lang="en-US" dirty="0"/>
-              <a:t>Bootstrap and jackknife methods: see code in section 4.5</a:t>
+              <a:t>: see code in section 4.5</a:t>
             </a:r>
           </a:p>
         </p:txBody>
@@ -4587,8 +4632,8 @@
           </a:p>
         </p:txBody>
       </p:sp>
-      <mc:AlternateContent xmlns:mc="http://schemas.openxmlformats.org/markup-compatibility/2006">
-        <mc:Choice xmlns:a14="http://schemas.microsoft.com/office/drawing/2010/main" Requires="a14">
+      <mc:AlternateContent xmlns:mc="http://schemas.openxmlformats.org/markup-compatibility/2006" xmlns:a14="http://schemas.microsoft.com/office/drawing/2010/main">
+        <mc:Choice Requires="a14">
           <p:sp>
             <p:nvSpPr>
               <p:cNvPr id="3" name="Content Placeholder 2">
@@ -4787,7 +4832,7 @@
             </p:txBody>
           </p:sp>
         </mc:Choice>
-        <mc:Fallback>
+        <mc:Fallback xmlns="">
           <p:sp>
             <p:nvSpPr>
               <p:cNvPr id="3" name="Content Placeholder 2">

</xml_diff>